<commit_message>
chg: Updates to TGT list (added responsibilities to more targets for Neck, Varzat, Jonde and Lefty)
</commit_message>
<xml_diff>
--- a/INTEL/VID/WIP/INTREP VID B-002 Generic Air Force Structure.pptx
+++ b/INTEL/VID/WIP/INTREP VID B-002 Generic Air Force Structure.pptx
@@ -204,7 +204,7 @@
             <a:fld id="{40637A30-8EE1-4060-9976-8832FC89EE34}" type="datetimeFigureOut">
               <a:rPr lang="nb-NO" smtClean="0"/>
               <a:pPr/>
-              <a:t>18.05.2023</a:t>
+              <a:t>01.02.2025</a:t>
             </a:fld>
             <a:endParaRPr lang="nb-NO"/>
           </a:p>
@@ -3986,58 +3986,44 @@
                 <a:latin typeface="Arial" pitchFamily="34" charset="0"/>
                 <a:cs typeface="Arial" pitchFamily="34" charset="0"/>
               </a:rPr>
-              <a:t>Published: </a:t>
-            </a:r>
+              <a:t>Published: 2023-05-18</a:t>
+            </a:r>
+            <a:endParaRPr lang="en-US" dirty="0">
+              <a:latin typeface="Arial" pitchFamily="34" charset="0"/>
+              <a:cs typeface="Arial" pitchFamily="34" charset="0"/>
+            </a:endParaRPr>
+          </a:p>
+        </p:txBody>
+      </p:sp>
+      <p:sp>
+        <p:nvSpPr>
+          <p:cNvPr id="11" name="TekstSylinder 10"/>
+          <p:cNvSpPr txBox="1"/>
+          <p:nvPr/>
+        </p:nvSpPr>
+        <p:spPr>
+          <a:xfrm>
+            <a:off x="0" y="8100392"/>
+            <a:ext cx="5143500" cy="369332"/>
+          </a:xfrm>
+          <a:prstGeom prst="rect">
+            <a:avLst/>
+          </a:prstGeom>
+          <a:noFill/>
+        </p:spPr>
+        <p:txBody>
+          <a:bodyPr wrap="square" rtlCol="0">
+            <a:spAutoFit/>
+          </a:bodyPr>
+          <a:lstStyle/>
+          <a:p>
+            <a:pPr algn="ctr"/>
             <a:r>
               <a:rPr lang="en-US" dirty="0" smtClean="0">
                 <a:latin typeface="Arial" pitchFamily="34" charset="0"/>
                 <a:cs typeface="Arial" pitchFamily="34" charset="0"/>
               </a:rPr>
-              <a:t>2023-05-18</a:t>
-            </a:r>
-            <a:endParaRPr lang="en-US" dirty="0">
-              <a:latin typeface="Arial" pitchFamily="34" charset="0"/>
-              <a:cs typeface="Arial" pitchFamily="34" charset="0"/>
-            </a:endParaRPr>
-          </a:p>
-        </p:txBody>
-      </p:sp>
-      <p:sp>
-        <p:nvSpPr>
-          <p:cNvPr id="11" name="TekstSylinder 10"/>
-          <p:cNvSpPr txBox="1"/>
-          <p:nvPr/>
-        </p:nvSpPr>
-        <p:spPr>
-          <a:xfrm>
-            <a:off x="0" y="8100392"/>
-            <a:ext cx="5143500" cy="369332"/>
-          </a:xfrm>
-          <a:prstGeom prst="rect">
-            <a:avLst/>
-          </a:prstGeom>
-          <a:noFill/>
-        </p:spPr>
-        <p:txBody>
-          <a:bodyPr wrap="square" rtlCol="0">
-            <a:spAutoFit/>
-          </a:bodyPr>
-          <a:lstStyle/>
-          <a:p>
-            <a:pPr algn="ctr"/>
-            <a:r>
-              <a:rPr lang="en-US" dirty="0" smtClean="0">
-                <a:latin typeface="Arial" pitchFamily="34" charset="0"/>
-                <a:cs typeface="Arial" pitchFamily="34" charset="0"/>
-              </a:rPr>
-              <a:t>Version: </a:t>
-            </a:r>
-            <a:r>
-              <a:rPr lang="en-US" dirty="0" smtClean="0">
-                <a:latin typeface="Arial" pitchFamily="34" charset="0"/>
-                <a:cs typeface="Arial" pitchFamily="34" charset="0"/>
-              </a:rPr>
-              <a:t>2.1</a:t>
+              <a:t>Version: 2.1</a:t>
             </a:r>
             <a:endParaRPr lang="en-US" dirty="0">
               <a:latin typeface="Arial" pitchFamily="34" charset="0"/>

</xml_diff>